<commit_message>
Improved implementation and diagrams.
</commit_message>
<xml_diff>
--- a/presentations/2016.04-bootstrapping-implementation.pptx
+++ b/presentations/2016.04-bootstrapping-implementation.pptx
@@ -5,18 +5,22 @@
     <p:sldMasterId id="2147483648" r:id="rId1"/>
   </p:sldMasterIdLst>
   <p:notesMasterIdLst>
-    <p:notesMasterId r:id="rId11"/>
+    <p:notesMasterId r:id="rId12"/>
   </p:notesMasterIdLst>
+  <p:handoutMasterIdLst>
+    <p:handoutMasterId r:id="rId13"/>
+  </p:handoutMasterIdLst>
   <p:sldIdLst>
     <p:sldId id="256" r:id="rId2"/>
     <p:sldId id="265" r:id="rId3"/>
     <p:sldId id="266" r:id="rId4"/>
     <p:sldId id="267" r:id="rId5"/>
     <p:sldId id="257" r:id="rId6"/>
-    <p:sldId id="258" r:id="rId7"/>
-    <p:sldId id="260" r:id="rId8"/>
-    <p:sldId id="261" r:id="rId9"/>
-    <p:sldId id="263" r:id="rId10"/>
+    <p:sldId id="269" r:id="rId7"/>
+    <p:sldId id="258" r:id="rId8"/>
+    <p:sldId id="260" r:id="rId9"/>
+    <p:sldId id="261" r:id="rId10"/>
+    <p:sldId id="263" r:id="rId11"/>
   </p:sldIdLst>
   <p:sldSz cx="13004800" cy="9753600"/>
   <p:notesSz cx="6858000" cy="9144000"/>
@@ -319,6 +323,171 @@
     </a:lvl9pPr>
   </p:defaultTextStyle>
 </p:presentation>
+</file>
+
+<file path=ppt/handoutMasters/handoutMaster1.xml><?xml version="1.0" encoding="utf-8"?>
+<p:handoutMaster xmlns:a="http://schemas.openxmlformats.org/drawingml/2006/main" xmlns:r="http://schemas.openxmlformats.org/officeDocument/2006/relationships" xmlns:p="http://schemas.openxmlformats.org/presentationml/2006/main">
+  <p:cSld>
+    <p:bg>
+      <p:bgRef idx="1001">
+        <a:schemeClr val="bg1"/>
+      </p:bgRef>
+    </p:bg>
+    <p:spTree>
+      <p:nvGrpSpPr>
+        <p:cNvPr id="1" name=""/>
+        <p:cNvGrpSpPr/>
+        <p:nvPr/>
+      </p:nvGrpSpPr>
+      <p:grpSpPr>
+        <a:xfrm>
+          <a:off x="0" y="0"/>
+          <a:ext cx="0" cy="0"/>
+          <a:chOff x="0" y="0"/>
+          <a:chExt cx="0" cy="0"/>
+        </a:xfrm>
+      </p:grpSpPr>
+      <p:sp>
+        <p:nvSpPr>
+          <p:cNvPr id="2" name="Header Placeholder 1"/>
+          <p:cNvSpPr>
+            <a:spLocks noGrp="1"/>
+          </p:cNvSpPr>
+          <p:nvPr>
+            <p:ph type="hdr" sz="quarter"/>
+          </p:nvPr>
+        </p:nvSpPr>
+        <p:spPr>
+          <a:xfrm>
+            <a:off x="0" y="0"/>
+            <a:ext cx="2971800" cy="457200"/>
+          </a:xfrm>
+          <a:prstGeom prst="rect">
+            <a:avLst/>
+          </a:prstGeom>
+        </p:spPr>
+        <p:txBody>
+          <a:bodyPr vert="horz" lIns="91440" tIns="45720" rIns="91440" bIns="45720" rtlCol="0"/>
+          <a:lstStyle>
+            <a:lvl1pPr algn="l">
+              <a:defRPr sz="1200"/>
+            </a:lvl1pPr>
+          </a:lstStyle>
+          <a:p>
+            <a:endParaRPr lang="en-US"/>
+          </a:p>
+        </p:txBody>
+      </p:sp>
+      <p:sp>
+        <p:nvSpPr>
+          <p:cNvPr id="3" name="Date Placeholder 2"/>
+          <p:cNvSpPr>
+            <a:spLocks noGrp="1"/>
+          </p:cNvSpPr>
+          <p:nvPr>
+            <p:ph type="dt" sz="quarter" idx="1"/>
+          </p:nvPr>
+        </p:nvSpPr>
+        <p:spPr>
+          <a:xfrm>
+            <a:off x="3884613" y="0"/>
+            <a:ext cx="2971800" cy="457200"/>
+          </a:xfrm>
+          <a:prstGeom prst="rect">
+            <a:avLst/>
+          </a:prstGeom>
+        </p:spPr>
+        <p:txBody>
+          <a:bodyPr vert="horz" lIns="91440" tIns="45720" rIns="91440" bIns="45720" rtlCol="0"/>
+          <a:lstStyle>
+            <a:lvl1pPr algn="r">
+              <a:defRPr sz="1200"/>
+            </a:lvl1pPr>
+          </a:lstStyle>
+          <a:p>
+            <a:fld id="{CDCD9C6F-9F77-FC49-AE9C-04CF86605AB8}" type="datetimeFigureOut">
+              <a:rPr lang="en-US" smtClean="0"/>
+              <a:t>4/4/16</a:t>
+            </a:fld>
+            <a:endParaRPr lang="en-US"/>
+          </a:p>
+        </p:txBody>
+      </p:sp>
+      <p:sp>
+        <p:nvSpPr>
+          <p:cNvPr id="4" name="Footer Placeholder 3"/>
+          <p:cNvSpPr>
+            <a:spLocks noGrp="1"/>
+          </p:cNvSpPr>
+          <p:nvPr>
+            <p:ph type="ftr" sz="quarter" idx="2"/>
+          </p:nvPr>
+        </p:nvSpPr>
+        <p:spPr>
+          <a:xfrm>
+            <a:off x="0" y="8685213"/>
+            <a:ext cx="2971800" cy="457200"/>
+          </a:xfrm>
+          <a:prstGeom prst="rect">
+            <a:avLst/>
+          </a:prstGeom>
+        </p:spPr>
+        <p:txBody>
+          <a:bodyPr vert="horz" lIns="91440" tIns="45720" rIns="91440" bIns="45720" rtlCol="0" anchor="b"/>
+          <a:lstStyle>
+            <a:lvl1pPr algn="l">
+              <a:defRPr sz="1200"/>
+            </a:lvl1pPr>
+          </a:lstStyle>
+          <a:p>
+            <a:endParaRPr lang="en-US"/>
+          </a:p>
+        </p:txBody>
+      </p:sp>
+      <p:sp>
+        <p:nvSpPr>
+          <p:cNvPr id="5" name="Slide Number Placeholder 4"/>
+          <p:cNvSpPr>
+            <a:spLocks noGrp="1"/>
+          </p:cNvSpPr>
+          <p:nvPr>
+            <p:ph type="sldNum" sz="quarter" idx="3"/>
+          </p:nvPr>
+        </p:nvSpPr>
+        <p:spPr>
+          <a:xfrm>
+            <a:off x="3884613" y="8685213"/>
+            <a:ext cx="2971800" cy="457200"/>
+          </a:xfrm>
+          <a:prstGeom prst="rect">
+            <a:avLst/>
+          </a:prstGeom>
+        </p:spPr>
+        <p:txBody>
+          <a:bodyPr vert="horz" lIns="91440" tIns="45720" rIns="91440" bIns="45720" rtlCol="0" anchor="b"/>
+          <a:lstStyle>
+            <a:lvl1pPr algn="r">
+              <a:defRPr sz="1200"/>
+            </a:lvl1pPr>
+          </a:lstStyle>
+          <a:p>
+            <a:fld id="{57FF2139-0C42-E643-87C0-0D65839B07B8}" type="slidenum">
+              <a:rPr lang="en-US" smtClean="0"/>
+              <a:t>‹#›</a:t>
+            </a:fld>
+            <a:endParaRPr lang="en-US"/>
+          </a:p>
+        </p:txBody>
+      </p:sp>
+    </p:spTree>
+    <p:extLst>
+      <p:ext uri="{BB962C8B-B14F-4D97-AF65-F5344CB8AC3E}">
+        <p14:creationId xmlns:p14="http://schemas.microsoft.com/office/powerpoint/2010/main" val="2389434401"/>
+      </p:ext>
+    </p:extLst>
+  </p:cSld>
+  <p:clrMap bg1="lt1" tx1="dk1" bg2="lt2" tx2="dk2" accent1="accent1" accent2="accent2" accent3="accent3" accent4="accent4" accent5="accent5" accent6="accent6" hlink="hlink" folHlink="folHlink"/>
+</p:handoutMaster>
 </file>
 
 <file path=ppt/notesMasters/notesMaster1.xml><?xml version="1.0" encoding="utf-8"?>
@@ -3281,8 +3450,10 @@
           </a:lstStyle>
           <a:p>
             <a:r>
-              <a:t>Future Work in Natural Language Processing</a:t>
-            </a:r>
+              <a:rPr lang="en-US" dirty="0" smtClean="0"/>
+              <a:t>Bootstrapping Implementation</a:t>
+            </a:r>
+            <a:endParaRPr dirty="0"/>
           </a:p>
         </p:txBody>
       </p:sp>
@@ -3317,6 +3488,119 @@
     <a:masterClrMapping/>
   </p:clrMapOvr>
   <p:transition xmlns:p14="http://schemas.microsoft.com/office/powerpoint/2010/main" spd="med"/>
+</p:sld>
+</file>
+
+<file path=ppt/slides/slide10.xml><?xml version="1.0" encoding="utf-8"?>
+<p:sld xmlns:a="http://schemas.openxmlformats.org/drawingml/2006/main" xmlns:r="http://schemas.openxmlformats.org/officeDocument/2006/relationships" xmlns:p="http://schemas.openxmlformats.org/presentationml/2006/main">
+  <p:cSld>
+    <p:spTree>
+      <p:nvGrpSpPr>
+        <p:cNvPr id="1" name=""/>
+        <p:cNvGrpSpPr/>
+        <p:nvPr/>
+      </p:nvGrpSpPr>
+      <p:grpSpPr>
+        <a:xfrm>
+          <a:off x="0" y="0"/>
+          <a:ext cx="0" cy="0"/>
+          <a:chOff x="0" y="0"/>
+          <a:chExt cx="0" cy="0"/>
+        </a:xfrm>
+      </p:grpSpPr>
+      <p:sp>
+        <p:nvSpPr>
+          <p:cNvPr id="140" name="Shape 140"/>
+          <p:cNvSpPr>
+            <a:spLocks noGrp="1"/>
+          </p:cNvSpPr>
+          <p:nvPr>
+            <p:ph type="title"/>
+          </p:nvPr>
+        </p:nvSpPr>
+        <p:spPr>
+          <a:prstGeom prst="rect">
+            <a:avLst/>
+          </a:prstGeom>
+        </p:spPr>
+        <p:txBody>
+          <a:bodyPr/>
+          <a:lstStyle/>
+          <a:p>
+            <a:r>
+              <a:t>Questions?</a:t>
+            </a:r>
+          </a:p>
+        </p:txBody>
+      </p:sp>
+      <p:sp>
+        <p:nvSpPr>
+          <p:cNvPr id="2" name="TextBox 1"/>
+          <p:cNvSpPr txBox="1"/>
+          <p:nvPr/>
+        </p:nvSpPr>
+        <p:spPr>
+          <a:xfrm>
+            <a:off x="6172241" y="8926372"/>
+            <a:ext cx="690742" cy="748923"/>
+          </a:xfrm>
+          <a:prstGeom prst="rect">
+            <a:avLst/>
+          </a:prstGeom>
+          <a:noFill/>
+          <a:ln w="12700" cap="flat">
+            <a:noFill/>
+            <a:miter lim="400000"/>
+          </a:ln>
+          <a:effectLst/>
+          <a:sp3d/>
+        </p:spPr>
+        <p:style>
+          <a:lnRef idx="0">
+            <a:scrgbClr r="0" g="0" b="0"/>
+          </a:lnRef>
+          <a:fillRef idx="0">
+            <a:scrgbClr r="0" g="0" b="0"/>
+          </a:fillRef>
+          <a:effectRef idx="0">
+            <a:scrgbClr r="0" g="0" b="0"/>
+          </a:effectRef>
+          <a:fontRef idx="none"/>
+        </p:style>
+        <p:txBody>
+          <a:bodyPr rot="0" spcFirstLastPara="1" vertOverflow="overflow" horzOverflow="overflow" vert="horz" wrap="none" lIns="50800" tIns="50800" rIns="50800" bIns="50800" numCol="1" spcCol="38100" rtlCol="0" anchor="ctr">
+            <a:spAutoFit/>
+          </a:bodyPr>
+          <a:lstStyle/>
+          <a:p>
+            <a:fld id="{86CB4B4D-7CA3-9044-876B-883B54F8677D}" type="slidenum">
+              <a:rPr lang="en-US"/>
+              <a:pPr/>
+              <a:t>10</a:t>
+            </a:fld>
+            <a:endParaRPr kumimoji="0" lang="en-US" sz="4200" b="0" i="0" u="none" strike="noStrike" cap="none" spc="0" normalizeH="0" baseline="0">
+              <a:ln>
+                <a:noFill/>
+              </a:ln>
+              <a:solidFill>
+                <a:srgbClr val="515151"/>
+              </a:solidFill>
+              <a:effectLst/>
+              <a:uFillTx/>
+              <a:latin typeface="+mn-lt"/>
+              <a:ea typeface="+mn-ea"/>
+              <a:cs typeface="+mn-cs"/>
+              <a:sym typeface="Cochin"/>
+            </a:endParaRPr>
+          </a:p>
+        </p:txBody>
+      </p:sp>
+    </p:spTree>
+  </p:cSld>
+  <p:clrMapOvr>
+    <a:masterClrMapping/>
+  </p:clrMapOvr>
+  <p:transition xmlns:p14="http://schemas.microsoft.com/office/powerpoint/2010/main" spd="slow"/>
 </p:sld>
 </file>
 
@@ -4338,26 +4622,14 @@
             </a:pPr>
             <a:r>
               <a:rPr lang="en-US" sz="4800" dirty="0" smtClean="0"/>
-              <a:t>Bootstrapping – Quick </a:t>
-            </a:r>
-            <a:r>
-              <a:rPr lang="en-US" sz="4800" dirty="0" smtClean="0"/>
-              <a:t>Review</a:t>
-            </a:r>
-            <a:r>
-              <a:rPr lang="en-US" sz="4800" dirty="0" smtClean="0"/>
-              <a:t/>
+              <a:t>Bootstrapping – Quick Review</a:t>
             </a:r>
             <a:br>
               <a:rPr lang="en-US" sz="4800" dirty="0" smtClean="0"/>
             </a:br>
             <a:r>
               <a:rPr lang="en-US" sz="4800" dirty="0" smtClean="0"/>
-              <a:t>Now with </a:t>
-            </a:r>
-            <a:r>
-              <a:rPr lang="en-US" sz="4800" dirty="0" smtClean="0"/>
-              <a:t>User		 </a:t>
+              <a:t>Now with User		 </a:t>
             </a:r>
             <a:r>
               <a:rPr lang="en-US" sz="4800" dirty="0"/>
@@ -6181,6 +6453,36 @@
           <a:chExt cx="0" cy="0"/>
         </a:xfrm>
       </p:grpSpPr>
+      <p:pic>
+        <p:nvPicPr>
+          <p:cNvPr id="3" name="Picture 2" descr="Bootstrapping.png"/>
+          <p:cNvPicPr>
+            <a:picLocks noChangeAspect="1"/>
+          </p:cNvPicPr>
+          <p:nvPr/>
+        </p:nvPicPr>
+        <p:blipFill>
+          <a:blip r:embed="rId2">
+            <a:extLst>
+              <a:ext uri="{28A0092B-C50C-407E-A947-70E740481C1C}">
+                <a14:useLocalDpi xmlns:a14="http://schemas.microsoft.com/office/drawing/2010/main" val="0"/>
+              </a:ext>
+            </a:extLst>
+          </a:blip>
+          <a:stretch>
+            <a:fillRect/>
+          </a:stretch>
+        </p:blipFill>
+        <p:spPr>
+          <a:xfrm>
+            <a:off x="334809" y="2176107"/>
+            <a:ext cx="12459128" cy="7328014"/>
+          </a:xfrm>
+          <a:prstGeom prst="rect">
+            <a:avLst/>
+          </a:prstGeom>
+        </p:spPr>
+      </p:pic>
       <p:sp>
         <p:nvSpPr>
           <p:cNvPr id="122" name="Shape 122"/>
@@ -6206,35 +6508,6 @@
           </a:p>
         </p:txBody>
       </p:sp>
-      <p:pic>
-        <p:nvPicPr>
-          <p:cNvPr id="123" name="Boostrapping.png"/>
-          <p:cNvPicPr>
-            <a:picLocks noChangeAspect="1"/>
-          </p:cNvPicPr>
-          <p:nvPr/>
-        </p:nvPicPr>
-        <p:blipFill>
-          <a:blip r:embed="rId2">
-            <a:extLst/>
-          </a:blip>
-          <a:stretch>
-            <a:fillRect/>
-          </a:stretch>
-        </p:blipFill>
-        <p:spPr>
-          <a:xfrm>
-            <a:off x="222250" y="2127250"/>
-            <a:ext cx="12552839" cy="7471570"/>
-          </a:xfrm>
-          <a:prstGeom prst="rect">
-            <a:avLst/>
-          </a:prstGeom>
-          <a:ln w="12700">
-            <a:miter lim="400000"/>
-          </a:ln>
-        </p:spPr>
-      </p:pic>
       <p:sp>
         <p:nvSpPr>
           <p:cNvPr id="2" name="TextBox 1"/>
@@ -6323,9 +6596,39 @@
           <a:chExt cx="0" cy="0"/>
         </a:xfrm>
       </p:grpSpPr>
+      <p:pic>
+        <p:nvPicPr>
+          <p:cNvPr id="5" name="Picture 4" descr="PatternFeedback.png"/>
+          <p:cNvPicPr>
+            <a:picLocks noChangeAspect="1"/>
+          </p:cNvPicPr>
+          <p:nvPr/>
+        </p:nvPicPr>
+        <p:blipFill>
+          <a:blip r:embed="rId2">
+            <a:extLst>
+              <a:ext uri="{28A0092B-C50C-407E-A947-70E740481C1C}">
+                <a14:useLocalDpi xmlns:a14="http://schemas.microsoft.com/office/drawing/2010/main" val="0"/>
+              </a:ext>
+            </a:extLst>
+          </a:blip>
+          <a:stretch>
+            <a:fillRect/>
+          </a:stretch>
+        </p:blipFill>
+        <p:spPr>
+          <a:xfrm>
+            <a:off x="999031" y="2258008"/>
+            <a:ext cx="11218369" cy="7394265"/>
+          </a:xfrm>
+          <a:prstGeom prst="rect">
+            <a:avLst/>
+          </a:prstGeom>
+        </p:spPr>
+      </p:pic>
       <p:sp>
         <p:nvSpPr>
-          <p:cNvPr id="125" name="Shape 125"/>
+          <p:cNvPr id="122" name="Shape 122"/>
           <p:cNvSpPr>
             <a:spLocks noGrp="1"/>
           </p:cNvSpPr>
@@ -6343,43 +6646,10 @@
           <a:lstStyle/>
           <a:p>
             <a:r>
+              <a:rPr lang="en-US" dirty="0" smtClean="0"/>
               <a:t>Bootstrapping</a:t>
             </a:r>
-          </a:p>
-        </p:txBody>
-      </p:sp>
-      <p:sp>
-        <p:nvSpPr>
-          <p:cNvPr id="126" name="Shape 126"/>
-          <p:cNvSpPr>
-            <a:spLocks noGrp="1"/>
-          </p:cNvSpPr>
-          <p:nvPr>
-            <p:ph type="body" idx="1"/>
-          </p:nvPr>
-        </p:nvSpPr>
-        <p:spPr>
-          <a:prstGeom prst="rect">
-            <a:avLst/>
-          </a:prstGeom>
-        </p:spPr>
-        <p:txBody>
-          <a:bodyPr/>
-          <a:lstStyle/>
-          <a:p>
-            <a:r>
-              <a:t>Entity extraction process annotates document with cyber labels</a:t>
-            </a:r>
-          </a:p>
-          <a:p>
-            <a:r>
-              <a:t>Document is passed to relation extraction in streaming process &amp; stored in a temporary repository</a:t>
-            </a:r>
-          </a:p>
-          <a:p>
-            <a:r>
-              <a:t>Bootstrapping is offline process that utilizes the documents in the temporary repo</a:t>
-            </a:r>
+            <a:endParaRPr dirty="0"/>
           </a:p>
         </p:txBody>
       </p:sp>
@@ -6391,7 +6661,7 @@
         </p:nvSpPr>
         <p:spPr>
           <a:xfrm>
-            <a:off x="6172241" y="9004677"/>
+            <a:off x="6133751" y="8888373"/>
             <a:ext cx="690742" cy="748923"/>
           </a:xfrm>
           <a:prstGeom prst="rect">
@@ -6446,6 +6716,11 @@
         </p:txBody>
       </p:sp>
     </p:spTree>
+    <p:extLst>
+      <p:ext uri="{BB962C8B-B14F-4D97-AF65-F5344CB8AC3E}">
+        <p14:creationId xmlns:p14="http://schemas.microsoft.com/office/powerpoint/2010/main" val="542952069"/>
+      </p:ext>
+    </p:extLst>
   </p:cSld>
   <p:clrMapOvr>
     <a:masterClrMapping/>
@@ -6473,7 +6748,7 @@
       </p:grpSpPr>
       <p:sp>
         <p:nvSpPr>
-          <p:cNvPr id="131" name="Shape 131"/>
+          <p:cNvPr id="125" name="Shape 125"/>
           <p:cNvSpPr>
             <a:spLocks noGrp="1"/>
           </p:cNvSpPr>
@@ -6491,14 +6766,14 @@
           <a:lstStyle/>
           <a:p>
             <a:r>
-              <a:t>User Feedback</a:t>
+              <a:t>Bootstrapping</a:t>
             </a:r>
           </a:p>
         </p:txBody>
       </p:sp>
       <p:sp>
         <p:nvSpPr>
-          <p:cNvPr id="132" name="Shape 132"/>
+          <p:cNvPr id="126" name="Shape 126"/>
           <p:cNvSpPr>
             <a:spLocks noGrp="1"/>
           </p:cNvSpPr>
@@ -6516,46 +6791,30 @@
           <a:lstStyle/>
           <a:p>
             <a:r>
-              <a:t>Pattern/relation scores and threshold determines what to ask user</a:t>
-            </a:r>
-          </a:p>
-          <a:p>
-            <a:r>
-              <a:t>Query user on relationships</a:t>
-            </a:r>
-          </a:p>
-          <a:p>
-            <a:pPr lvl="1">
-              <a:defRPr sz="3000"/>
-            </a:pPr>
-            <a:r>
-              <a:t>Is Microsoft software_vendor_of Windows?</a:t>
-            </a:r>
-          </a:p>
-          <a:p>
-            <a:r>
-              <a:t>Query user on entities</a:t>
-            </a:r>
-          </a:p>
-          <a:p>
-            <a:pPr lvl="1">
-              <a:defRPr sz="3000"/>
-            </a:pPr>
-            <a:r>
-              <a:t>Is Microsoft a software_vendor?</a:t>
+              <a:t>Entity extraction process annotates document with cyber labels</a:t>
+            </a:r>
+          </a:p>
+          <a:p>
+            <a:r>
+              <a:t>Document is passed to relation extraction in streaming process &amp; stored in a temporary repository</a:t>
+            </a:r>
+          </a:p>
+          <a:p>
+            <a:r>
+              <a:t>Bootstrapping is offline process that utilizes the documents in the temporary repo</a:t>
             </a:r>
           </a:p>
         </p:txBody>
       </p:sp>
       <p:sp>
         <p:nvSpPr>
-          <p:cNvPr id="3" name="TextBox 2"/>
+          <p:cNvPr id="2" name="TextBox 1"/>
           <p:cNvSpPr txBox="1"/>
           <p:nvPr/>
         </p:nvSpPr>
         <p:spPr>
           <a:xfrm>
-            <a:off x="6120945" y="8964847"/>
+            <a:off x="6172241" y="9004677"/>
             <a:ext cx="690742" cy="748923"/>
           </a:xfrm>
           <a:prstGeom prst="rect">
@@ -6592,7 +6851,7 @@
               <a:pPr/>
               <a:t>7</a:t>
             </a:fld>
-            <a:endParaRPr kumimoji="0" lang="en-US" sz="4200" b="0" i="0" u="none" strike="noStrike" cap="none" spc="0" normalizeH="0" baseline="0">
+            <a:endParaRPr kumimoji="0" lang="en-US" sz="4200" b="0" i="0" u="none" strike="noStrike" cap="none" spc="0" normalizeH="0" baseline="0" dirty="0">
               <a:ln>
                 <a:noFill/>
               </a:ln>
@@ -6637,7 +6896,7 @@
       </p:grpSpPr>
       <p:sp>
         <p:nvSpPr>
-          <p:cNvPr id="134" name="Shape 134"/>
+          <p:cNvPr id="131" name="Shape 131"/>
           <p:cNvSpPr>
             <a:spLocks noGrp="1"/>
           </p:cNvSpPr>
@@ -6662,7 +6921,7 @@
       </p:sp>
       <p:sp>
         <p:nvSpPr>
-          <p:cNvPr id="135" name="Shape 135"/>
+          <p:cNvPr id="132" name="Shape 132"/>
           <p:cNvSpPr>
             <a:spLocks noGrp="1"/>
           </p:cNvSpPr>
@@ -6676,29 +6935,130 @@
           </a:prstGeom>
         </p:spPr>
         <p:txBody>
-          <a:bodyPr/>
+          <a:bodyPr>
+            <a:normAutofit lnSpcReduction="10000"/>
+          </a:bodyPr>
           <a:lstStyle/>
           <a:p>
             <a:r>
-              <a:t>Relationship responses are stored, then added to set of patterns used by streaming pipeline</a:t>
-            </a:r>
-          </a:p>
-          <a:p>
-            <a:r>
-              <a:t>Entity responses are stored, then used with the training data as periodic retraining of the averaged perceptron</a:t>
+              <a:rPr lang="en-US" dirty="0" smtClean="0"/>
+              <a:t>S</a:t>
+            </a:r>
+            <a:r>
+              <a:rPr dirty="0" smtClean="0"/>
+              <a:t>cores </a:t>
+            </a:r>
+            <a:r>
+              <a:rPr lang="en-US" dirty="0" smtClean="0"/>
+              <a:t>of candidate patterns </a:t>
+            </a:r>
+            <a:r>
+              <a:rPr dirty="0" smtClean="0"/>
+              <a:t>determine wh</a:t>
+            </a:r>
+            <a:r>
+              <a:rPr lang="en-US" dirty="0" smtClean="0"/>
+              <a:t>at</a:t>
+            </a:r>
+            <a:r>
+              <a:rPr dirty="0" smtClean="0"/>
+              <a:t> </a:t>
+            </a:r>
+            <a:r>
+              <a:rPr dirty="0"/>
+              <a:t>to ask user</a:t>
+            </a:r>
+          </a:p>
+          <a:p>
+            <a:r>
+              <a:rPr dirty="0"/>
+              <a:t>Query user on relationships</a:t>
+            </a:r>
+          </a:p>
+          <a:p>
+            <a:pPr lvl="1">
+              <a:defRPr sz="3000"/>
+            </a:pPr>
+            <a:r>
+              <a:rPr lang="en-US" dirty="0" smtClean="0"/>
+              <a:t>Is </a:t>
+            </a:r>
+            <a:r>
+              <a:rPr lang="en-US" dirty="0" err="1" smtClean="0"/>
+              <a:t>hasVulnerability</a:t>
+            </a:r>
+            <a:r>
+              <a:rPr lang="en-US" dirty="0" smtClean="0"/>
+              <a:t> a relationship between </a:t>
+            </a:r>
+            <a:r>
+              <a:rPr lang="en-US" u="sng" dirty="0" smtClean="0"/>
+              <a:t>Internet Explorer</a:t>
+            </a:r>
+            <a:r>
+              <a:rPr lang="en-US" dirty="0" smtClean="0"/>
+              <a:t> &amp; </a:t>
+            </a:r>
+            <a:r>
+              <a:rPr lang="en-US" u="sng" dirty="0" smtClean="0"/>
+              <a:t>cross-site scripting</a:t>
+            </a:r>
+            <a:r>
+              <a:rPr dirty="0" smtClean="0"/>
+              <a:t>?</a:t>
+            </a:r>
+            <a:endParaRPr dirty="0"/>
+          </a:p>
+          <a:p>
+            <a:r>
+              <a:rPr dirty="0"/>
+              <a:t>Query user on entities</a:t>
+            </a:r>
+          </a:p>
+          <a:p>
+            <a:pPr lvl="1">
+              <a:defRPr sz="3000"/>
+            </a:pPr>
+            <a:r>
+              <a:rPr dirty="0"/>
+              <a:t>Is </a:t>
+            </a:r>
+            <a:r>
+              <a:rPr u="sng" dirty="0"/>
+              <a:t>Microsoft</a:t>
+            </a:r>
+            <a:r>
+              <a:rPr dirty="0"/>
+              <a:t> a </a:t>
+            </a:r>
+            <a:r>
+              <a:rPr dirty="0" smtClean="0"/>
+              <a:t>software</a:t>
+            </a:r>
+            <a:r>
+              <a:rPr lang="en-US" dirty="0" smtClean="0"/>
+              <a:t> </a:t>
+            </a:r>
+            <a:r>
+              <a:rPr dirty="0" smtClean="0"/>
+              <a:t>vendor</a:t>
+            </a:r>
+            <a:r>
+              <a:rPr dirty="0"/>
+              <a:t>?</a:t>
             </a:r>
           </a:p>
         </p:txBody>
       </p:sp>
       <p:sp>
         <p:nvSpPr>
-          <p:cNvPr id="2" name="TextBox 1"/>
+          <p:cNvPr id="3" name="TextBox 2"/>
           <p:cNvSpPr txBox="1"/>
           <p:nvPr/>
         </p:nvSpPr>
         <p:spPr>
           <a:xfrm>
-            <a:off x="6363652" y="9003323"/>
+            <a:off x="6120945" y="8964847"/>
             <a:ext cx="690742" cy="748923"/>
           </a:xfrm>
           <a:prstGeom prst="rect">
@@ -6778,9 +7138,39 @@
           <a:chExt cx="0" cy="0"/>
         </a:xfrm>
       </p:grpSpPr>
+      <p:pic>
+        <p:nvPicPr>
+          <p:cNvPr id="3" name="Picture 2" descr="EntityFeedback.png"/>
+          <p:cNvPicPr>
+            <a:picLocks noChangeAspect="1"/>
+          </p:cNvPicPr>
+          <p:nvPr/>
+        </p:nvPicPr>
+        <p:blipFill>
+          <a:blip r:embed="rId2">
+            <a:extLst>
+              <a:ext uri="{28A0092B-C50C-407E-A947-70E740481C1C}">
+                <a14:useLocalDpi xmlns:a14="http://schemas.microsoft.com/office/drawing/2010/main" val="0"/>
+              </a:ext>
+            </a:extLst>
+          </a:blip>
+          <a:stretch>
+            <a:fillRect/>
+          </a:stretch>
+        </p:blipFill>
+        <p:spPr>
+          <a:xfrm>
+            <a:off x="1177488" y="2199061"/>
+            <a:ext cx="11039911" cy="7296325"/>
+          </a:xfrm>
+          <a:prstGeom prst="rect">
+            <a:avLst/>
+          </a:prstGeom>
+        </p:spPr>
+      </p:pic>
       <p:sp>
         <p:nvSpPr>
-          <p:cNvPr id="140" name="Shape 140"/>
+          <p:cNvPr id="134" name="Shape 134"/>
           <p:cNvSpPr>
             <a:spLocks noGrp="1"/>
           </p:cNvSpPr>
@@ -6798,7 +7188,7 @@
           <a:lstStyle/>
           <a:p>
             <a:r>
-              <a:t>Questions?</a:t>
+              <a:t>User Feedback</a:t>
             </a:r>
           </a:p>
         </p:txBody>
@@ -6811,7 +7201,7 @@
         </p:nvSpPr>
         <p:spPr>
           <a:xfrm>
-            <a:off x="6172241" y="8926372"/>
+            <a:off x="6363652" y="9003323"/>
             <a:ext cx="690742" cy="748923"/>
           </a:xfrm>
           <a:prstGeom prst="rect">
@@ -9016,4 +9406,324 @@
   </a:objectDefaults>
   <a:extraClrSchemeLst/>
 </a:theme>
+</file>
+
+<file path=ppt/theme/theme3.xml><?xml version="1.0" encoding="utf-8"?>
+<a:theme xmlns:a="http://schemas.openxmlformats.org/drawingml/2006/main" name="Office Theme">
+  <a:themeElements>
+    <a:clrScheme name="Office">
+      <a:dk1>
+        <a:sysClr val="windowText" lastClr="000000"/>
+      </a:dk1>
+      <a:lt1>
+        <a:sysClr val="window" lastClr="FFFFFF"/>
+      </a:lt1>
+      <a:dk2>
+        <a:srgbClr val="1F497D"/>
+      </a:dk2>
+      <a:lt2>
+        <a:srgbClr val="EEECE1"/>
+      </a:lt2>
+      <a:accent1>
+        <a:srgbClr val="4F81BD"/>
+      </a:accent1>
+      <a:accent2>
+        <a:srgbClr val="C0504D"/>
+      </a:accent2>
+      <a:accent3>
+        <a:srgbClr val="9BBB59"/>
+      </a:accent3>
+      <a:accent4>
+        <a:srgbClr val="8064A2"/>
+      </a:accent4>
+      <a:accent5>
+        <a:srgbClr val="4BACC6"/>
+      </a:accent5>
+      <a:accent6>
+        <a:srgbClr val="F79646"/>
+      </a:accent6>
+      <a:hlink>
+        <a:srgbClr val="0000FF"/>
+      </a:hlink>
+      <a:folHlink>
+        <a:srgbClr val="800080"/>
+      </a:folHlink>
+    </a:clrScheme>
+    <a:fontScheme name="Office">
+      <a:majorFont>
+        <a:latin typeface="Calibri"/>
+        <a:ea typeface=""/>
+        <a:cs typeface=""/>
+        <a:font script="Jpan" typeface="ＭＳ Ｐゴシック"/>
+        <a:font script="Hang" typeface="맑은 고딕"/>
+        <a:font script="Hans" typeface="宋体"/>
+        <a:font script="Hant" typeface="新細明體"/>
+        <a:font script="Arab" typeface="Times New Roman"/>
+        <a:font script="Hebr" typeface="Times New Roman"/>
+        <a:font script="Thai" typeface="Angsana New"/>
+        <a:font script="Ethi" typeface="Nyala"/>
+        <a:font script="Beng" typeface="Vrinda"/>
+        <a:font script="Gujr" typeface="Shruti"/>
+        <a:font script="Khmr" typeface="MoolBoran"/>
+        <a:font script="Knda" typeface="Tunga"/>
+        <a:font script="Guru" typeface="Raavi"/>
+        <a:font script="Cans" typeface="Euphemia"/>
+        <a:font script="Cher" typeface="Plantagenet Cherokee"/>
+        <a:font script="Yiii" typeface="Microsoft Yi Baiti"/>
+        <a:font script="Tibt" typeface="Microsoft Himalaya"/>
+        <a:font script="Thaa" typeface="MV Boli"/>
+        <a:font script="Deva" typeface="Mangal"/>
+        <a:font script="Telu" typeface="Gautami"/>
+        <a:font script="Taml" typeface="Latha"/>
+        <a:font script="Syrc" typeface="Estrangelo Edessa"/>
+        <a:font script="Orya" typeface="Kalinga"/>
+        <a:font script="Mlym" typeface="Kartika"/>
+        <a:font script="Laoo" typeface="DokChampa"/>
+        <a:font script="Sinh" typeface="Iskoola Pota"/>
+        <a:font script="Mong" typeface="Mongolian Baiti"/>
+        <a:font script="Viet" typeface="Times New Roman"/>
+        <a:font script="Uigh" typeface="Microsoft Uighur"/>
+        <a:font script="Geor" typeface="Sylfaen"/>
+      </a:majorFont>
+      <a:minorFont>
+        <a:latin typeface="Calibri"/>
+        <a:ea typeface=""/>
+        <a:cs typeface=""/>
+        <a:font script="Jpan" typeface="ＭＳ Ｐゴシック"/>
+        <a:font script="Hang" typeface="맑은 고딕"/>
+        <a:font script="Hans" typeface="宋体"/>
+        <a:font script="Hant" typeface="新細明體"/>
+        <a:font script="Arab" typeface="Arial"/>
+        <a:font script="Hebr" typeface="Arial"/>
+        <a:font script="Thai" typeface="Cordia New"/>
+        <a:font script="Ethi" typeface="Nyala"/>
+        <a:font script="Beng" typeface="Vrinda"/>
+        <a:font script="Gujr" typeface="Shruti"/>
+        <a:font script="Khmr" typeface="DaunPenh"/>
+        <a:font script="Knda" typeface="Tunga"/>
+        <a:font script="Guru" typeface="Raavi"/>
+        <a:font script="Cans" typeface="Euphemia"/>
+        <a:font script="Cher" typeface="Plantagenet Cherokee"/>
+        <a:font script="Yiii" typeface="Microsoft Yi Baiti"/>
+        <a:font script="Tibt" typeface="Microsoft Himalaya"/>
+        <a:font script="Thaa" typeface="MV Boli"/>
+        <a:font script="Deva" typeface="Mangal"/>
+        <a:font script="Telu" typeface="Gautami"/>
+        <a:font script="Taml" typeface="Latha"/>
+        <a:font script="Syrc" typeface="Estrangelo Edessa"/>
+        <a:font script="Orya" typeface="Kalinga"/>
+        <a:font script="Mlym" typeface="Kartika"/>
+        <a:font script="Laoo" typeface="DokChampa"/>
+        <a:font script="Sinh" typeface="Iskoola Pota"/>
+        <a:font script="Mong" typeface="Mongolian Baiti"/>
+        <a:font script="Viet" typeface="Arial"/>
+        <a:font script="Uigh" typeface="Microsoft Uighur"/>
+        <a:font script="Geor" typeface="Sylfaen"/>
+      </a:minorFont>
+    </a:fontScheme>
+    <a:fmtScheme name="Office">
+      <a:fillStyleLst>
+        <a:solidFill>
+          <a:schemeClr val="phClr"/>
+        </a:solidFill>
+        <a:gradFill rotWithShape="1">
+          <a:gsLst>
+            <a:gs pos="0">
+              <a:schemeClr val="phClr">
+                <a:tint val="50000"/>
+                <a:satMod val="300000"/>
+              </a:schemeClr>
+            </a:gs>
+            <a:gs pos="35000">
+              <a:schemeClr val="phClr">
+                <a:tint val="37000"/>
+                <a:satMod val="300000"/>
+              </a:schemeClr>
+            </a:gs>
+            <a:gs pos="100000">
+              <a:schemeClr val="phClr">
+                <a:tint val="15000"/>
+                <a:satMod val="350000"/>
+              </a:schemeClr>
+            </a:gs>
+          </a:gsLst>
+          <a:lin ang="16200000" scaled="1"/>
+        </a:gradFill>
+        <a:gradFill rotWithShape="1">
+          <a:gsLst>
+            <a:gs pos="0">
+              <a:schemeClr val="phClr">
+                <a:tint val="100000"/>
+                <a:shade val="100000"/>
+                <a:satMod val="130000"/>
+              </a:schemeClr>
+            </a:gs>
+            <a:gs pos="100000">
+              <a:schemeClr val="phClr">
+                <a:tint val="50000"/>
+                <a:shade val="100000"/>
+                <a:satMod val="350000"/>
+              </a:schemeClr>
+            </a:gs>
+          </a:gsLst>
+          <a:lin ang="16200000" scaled="0"/>
+        </a:gradFill>
+      </a:fillStyleLst>
+      <a:lnStyleLst>
+        <a:ln w="9525" cap="flat" cmpd="sng" algn="ctr">
+          <a:solidFill>
+            <a:schemeClr val="phClr">
+              <a:shade val="95000"/>
+              <a:satMod val="105000"/>
+            </a:schemeClr>
+          </a:solidFill>
+          <a:prstDash val="solid"/>
+        </a:ln>
+        <a:ln w="25400" cap="flat" cmpd="sng" algn="ctr">
+          <a:solidFill>
+            <a:schemeClr val="phClr"/>
+          </a:solidFill>
+          <a:prstDash val="solid"/>
+        </a:ln>
+        <a:ln w="38100" cap="flat" cmpd="sng" algn="ctr">
+          <a:solidFill>
+            <a:schemeClr val="phClr"/>
+          </a:solidFill>
+          <a:prstDash val="solid"/>
+        </a:ln>
+      </a:lnStyleLst>
+      <a:effectStyleLst>
+        <a:effectStyle>
+          <a:effectLst>
+            <a:outerShdw blurRad="40000" dist="20000" dir="5400000" rotWithShape="0">
+              <a:srgbClr val="000000">
+                <a:alpha val="38000"/>
+              </a:srgbClr>
+            </a:outerShdw>
+          </a:effectLst>
+        </a:effectStyle>
+        <a:effectStyle>
+          <a:effectLst>
+            <a:outerShdw blurRad="40000" dist="23000" dir="5400000" rotWithShape="0">
+              <a:srgbClr val="000000">
+                <a:alpha val="35000"/>
+              </a:srgbClr>
+            </a:outerShdw>
+          </a:effectLst>
+        </a:effectStyle>
+        <a:effectStyle>
+          <a:effectLst>
+            <a:outerShdw blurRad="40000" dist="23000" dir="5400000" rotWithShape="0">
+              <a:srgbClr val="000000">
+                <a:alpha val="35000"/>
+              </a:srgbClr>
+            </a:outerShdw>
+          </a:effectLst>
+          <a:scene3d>
+            <a:camera prst="orthographicFront">
+              <a:rot lat="0" lon="0" rev="0"/>
+            </a:camera>
+            <a:lightRig rig="threePt" dir="t">
+              <a:rot lat="0" lon="0" rev="1200000"/>
+            </a:lightRig>
+          </a:scene3d>
+          <a:sp3d>
+            <a:bevelT w="63500" h="25400"/>
+          </a:sp3d>
+        </a:effectStyle>
+      </a:effectStyleLst>
+      <a:bgFillStyleLst>
+        <a:solidFill>
+          <a:schemeClr val="phClr"/>
+        </a:solidFill>
+        <a:gradFill rotWithShape="1">
+          <a:gsLst>
+            <a:gs pos="0">
+              <a:schemeClr val="phClr">
+                <a:tint val="40000"/>
+                <a:satMod val="350000"/>
+              </a:schemeClr>
+            </a:gs>
+            <a:gs pos="40000">
+              <a:schemeClr val="phClr">
+                <a:tint val="45000"/>
+                <a:shade val="99000"/>
+                <a:satMod val="350000"/>
+              </a:schemeClr>
+            </a:gs>
+            <a:gs pos="100000">
+              <a:schemeClr val="phClr">
+                <a:shade val="20000"/>
+                <a:satMod val="255000"/>
+              </a:schemeClr>
+            </a:gs>
+          </a:gsLst>
+          <a:path path="circle">
+            <a:fillToRect l="50000" t="-80000" r="50000" b="180000"/>
+          </a:path>
+        </a:gradFill>
+        <a:gradFill rotWithShape="1">
+          <a:gsLst>
+            <a:gs pos="0">
+              <a:schemeClr val="phClr">
+                <a:tint val="80000"/>
+                <a:satMod val="300000"/>
+              </a:schemeClr>
+            </a:gs>
+            <a:gs pos="100000">
+              <a:schemeClr val="phClr">
+                <a:shade val="30000"/>
+                <a:satMod val="200000"/>
+              </a:schemeClr>
+            </a:gs>
+          </a:gsLst>
+          <a:path path="circle">
+            <a:fillToRect l="50000" t="50000" r="50000" b="50000"/>
+          </a:path>
+        </a:gradFill>
+      </a:bgFillStyleLst>
+    </a:fmtScheme>
+  </a:themeElements>
+  <a:objectDefaults>
+    <a:spDef>
+      <a:spPr/>
+      <a:bodyPr/>
+      <a:lstStyle/>
+      <a:style>
+        <a:lnRef idx="1">
+          <a:schemeClr val="accent1"/>
+        </a:lnRef>
+        <a:fillRef idx="3">
+          <a:schemeClr val="accent1"/>
+        </a:fillRef>
+        <a:effectRef idx="2">
+          <a:schemeClr val="accent1"/>
+        </a:effectRef>
+        <a:fontRef idx="minor">
+          <a:schemeClr val="lt1"/>
+        </a:fontRef>
+      </a:style>
+    </a:spDef>
+    <a:lnDef>
+      <a:spPr/>
+      <a:bodyPr/>
+      <a:lstStyle/>
+      <a:style>
+        <a:lnRef idx="2">
+          <a:schemeClr val="accent1"/>
+        </a:lnRef>
+        <a:fillRef idx="0">
+          <a:schemeClr val="accent1"/>
+        </a:fillRef>
+        <a:effectRef idx="1">
+          <a:schemeClr val="accent1"/>
+        </a:effectRef>
+        <a:fontRef idx="minor">
+          <a:schemeClr val="tx1"/>
+        </a:fontRef>
+      </a:style>
+    </a:lnDef>
+  </a:objectDefaults>
+  <a:extraClrSchemeLst/>
+</a:theme>
 </file>
</xml_diff>